<commit_message>
add images for ML week Total
</commit_message>
<xml_diff>
--- a/ml-week-lectures/learning_tree.pptx
+++ b/ml-week-lectures/learning_tree.pptx
@@ -6,7 +6,7 @@
   </p:sldMasterIdLst>
   <p:sldIdLst>
     <p:sldId id="256" r:id="rId2"/>
-    <p:sldId id="257" r:id="rId3"/>
+    <p:sldId id="258" r:id="rId3"/>
   </p:sldIdLst>
   <p:sldSz cx="12192000" cy="6858000"/>
   <p:notesSz cx="6858000" cy="9144000"/>
@@ -105,6 +105,11 @@
       </a:defRPr>
     </a:lvl9pPr>
   </p:defaultTextStyle>
+  <p:extLst>
+    <p:ext uri="{EFAFB233-063F-42B5-8137-9DF3F51BA10A}">
+      <p15:sldGuideLst xmlns:p15="http://schemas.microsoft.com/office/powerpoint/2012/main"/>
+    </p:ext>
+  </p:extLst>
 </p:presentation>
 </file>
 
@@ -257,7 +262,7 @@
           <a:p>
             <a:fld id="{412E0E6D-8AA3-4C45-8C7F-DBFE568E3351}" type="datetimeFigureOut">
               <a:rPr lang="fr-FR" smtClean="0"/>
-              <a:t>16/11/2019</a:t>
+              <a:t>17/11/2019</a:t>
             </a:fld>
             <a:endParaRPr lang="fr-FR"/>
           </a:p>
@@ -457,7 +462,7 @@
           <a:p>
             <a:fld id="{412E0E6D-8AA3-4C45-8C7F-DBFE568E3351}" type="datetimeFigureOut">
               <a:rPr lang="fr-FR" smtClean="0"/>
-              <a:t>16/11/2019</a:t>
+              <a:t>17/11/2019</a:t>
             </a:fld>
             <a:endParaRPr lang="fr-FR"/>
           </a:p>
@@ -667,7 +672,7 @@
           <a:p>
             <a:fld id="{412E0E6D-8AA3-4C45-8C7F-DBFE568E3351}" type="datetimeFigureOut">
               <a:rPr lang="fr-FR" smtClean="0"/>
-              <a:t>16/11/2019</a:t>
+              <a:t>17/11/2019</a:t>
             </a:fld>
             <a:endParaRPr lang="fr-FR"/>
           </a:p>
@@ -867,7 +872,7 @@
           <a:p>
             <a:fld id="{412E0E6D-8AA3-4C45-8C7F-DBFE568E3351}" type="datetimeFigureOut">
               <a:rPr lang="fr-FR" smtClean="0"/>
-              <a:t>16/11/2019</a:t>
+              <a:t>17/11/2019</a:t>
             </a:fld>
             <a:endParaRPr lang="fr-FR"/>
           </a:p>
@@ -1143,7 +1148,7 @@
           <a:p>
             <a:fld id="{412E0E6D-8AA3-4C45-8C7F-DBFE568E3351}" type="datetimeFigureOut">
               <a:rPr lang="fr-FR" smtClean="0"/>
-              <a:t>16/11/2019</a:t>
+              <a:t>17/11/2019</a:t>
             </a:fld>
             <a:endParaRPr lang="fr-FR"/>
           </a:p>
@@ -1411,7 +1416,7 @@
           <a:p>
             <a:fld id="{412E0E6D-8AA3-4C45-8C7F-DBFE568E3351}" type="datetimeFigureOut">
               <a:rPr lang="fr-FR" smtClean="0"/>
-              <a:t>16/11/2019</a:t>
+              <a:t>17/11/2019</a:t>
             </a:fld>
             <a:endParaRPr lang="fr-FR"/>
           </a:p>
@@ -1826,7 +1831,7 @@
           <a:p>
             <a:fld id="{412E0E6D-8AA3-4C45-8C7F-DBFE568E3351}" type="datetimeFigureOut">
               <a:rPr lang="fr-FR" smtClean="0"/>
-              <a:t>16/11/2019</a:t>
+              <a:t>17/11/2019</a:t>
             </a:fld>
             <a:endParaRPr lang="fr-FR"/>
           </a:p>
@@ -1968,7 +1973,7 @@
           <a:p>
             <a:fld id="{412E0E6D-8AA3-4C45-8C7F-DBFE568E3351}" type="datetimeFigureOut">
               <a:rPr lang="fr-FR" smtClean="0"/>
-              <a:t>16/11/2019</a:t>
+              <a:t>17/11/2019</a:t>
             </a:fld>
             <a:endParaRPr lang="fr-FR"/>
           </a:p>
@@ -2081,7 +2086,7 @@
           <a:p>
             <a:fld id="{412E0E6D-8AA3-4C45-8C7F-DBFE568E3351}" type="datetimeFigureOut">
               <a:rPr lang="fr-FR" smtClean="0"/>
-              <a:t>16/11/2019</a:t>
+              <a:t>17/11/2019</a:t>
             </a:fld>
             <a:endParaRPr lang="fr-FR"/>
           </a:p>
@@ -2394,7 +2399,7 @@
           <a:p>
             <a:fld id="{412E0E6D-8AA3-4C45-8C7F-DBFE568E3351}" type="datetimeFigureOut">
               <a:rPr lang="fr-FR" smtClean="0"/>
-              <a:t>16/11/2019</a:t>
+              <a:t>17/11/2019</a:t>
             </a:fld>
             <a:endParaRPr lang="fr-FR"/>
           </a:p>
@@ -2683,7 +2688,7 @@
           <a:p>
             <a:fld id="{412E0E6D-8AA3-4C45-8C7F-DBFE568E3351}" type="datetimeFigureOut">
               <a:rPr lang="fr-FR" smtClean="0"/>
-              <a:t>16/11/2019</a:t>
+              <a:t>17/11/2019</a:t>
             </a:fld>
             <a:endParaRPr lang="fr-FR"/>
           </a:p>
@@ -2926,7 +2931,7 @@
           <a:p>
             <a:fld id="{412E0E6D-8AA3-4C45-8C7F-DBFE568E3351}" type="datetimeFigureOut">
               <a:rPr lang="fr-FR" smtClean="0"/>
-              <a:t>16/11/2019</a:t>
+              <a:t>17/11/2019</a:t>
             </a:fld>
             <a:endParaRPr lang="fr-FR"/>
           </a:p>
@@ -4662,7 +4667,7 @@
         </p:nvSpPr>
         <p:spPr>
           <a:xfrm>
-            <a:off x="2350876" y="4498034"/>
+            <a:off x="2586244" y="4512512"/>
             <a:ext cx="947225" cy="414924"/>
           </a:xfrm>
           <a:prstGeom prst="roundRect">
@@ -4788,7 +4793,7 @@
         </p:nvSpPr>
         <p:spPr>
           <a:xfrm>
-            <a:off x="1373925" y="5625881"/>
+            <a:off x="1026516" y="5823805"/>
             <a:ext cx="993813" cy="406924"/>
           </a:xfrm>
           <a:prstGeom prst="roundRect">
@@ -5213,9 +5218,9 @@
           <p:nvPr/>
         </p:nvCxnSpPr>
         <p:spPr>
-          <a:xfrm>
-            <a:off x="1870376" y="3798332"/>
-            <a:ext cx="456" cy="1827549"/>
+          <a:xfrm flipH="1">
+            <a:off x="1523423" y="3798332"/>
+            <a:ext cx="346953" cy="2025473"/>
           </a:xfrm>
           <a:prstGeom prst="straightConnector1">
             <a:avLst/>
@@ -5260,7 +5265,7 @@
         <p:spPr>
           <a:xfrm>
             <a:off x="1870376" y="3798332"/>
-            <a:ext cx="954113" cy="699702"/>
+            <a:ext cx="1189481" cy="714180"/>
           </a:xfrm>
           <a:prstGeom prst="straightConnector1">
             <a:avLst/>
@@ -5304,8 +5309,8 @@
         </p:nvCxnSpPr>
         <p:spPr>
           <a:xfrm flipH="1">
-            <a:off x="2824489" y="3798332"/>
-            <a:ext cx="1977657" cy="699702"/>
+            <a:off x="3059857" y="3798332"/>
+            <a:ext cx="1742289" cy="714180"/>
           </a:xfrm>
           <a:prstGeom prst="straightConnector1">
             <a:avLst/>
@@ -5666,6 +5671,115 @@
           <a:xfrm>
             <a:off x="10576551" y="3936831"/>
             <a:ext cx="1182794" cy="671214"/>
+          </a:xfrm>
+          <a:prstGeom prst="straightConnector1">
+            <a:avLst/>
+          </a:prstGeom>
+          <a:ln w="38100">
+            <a:solidFill>
+              <a:schemeClr val="tx1"/>
+            </a:solidFill>
+            <a:tailEnd type="triangle"/>
+          </a:ln>
+        </p:spPr>
+        <p:style>
+          <a:lnRef idx="1">
+            <a:schemeClr val="accent1"/>
+          </a:lnRef>
+          <a:fillRef idx="0">
+            <a:schemeClr val="accent1"/>
+          </a:fillRef>
+          <a:effectRef idx="0">
+            <a:schemeClr val="accent1"/>
+          </a:effectRef>
+          <a:fontRef idx="minor">
+            <a:schemeClr val="tx1"/>
+          </a:fontRef>
+        </p:style>
+      </p:cxnSp>
+      <p:sp>
+        <p:nvSpPr>
+          <p:cNvPr id="51" name="Rounded Rectangle 50">
+            <a:extLst>
+              <a:ext uri="{FF2B5EF4-FFF2-40B4-BE49-F238E27FC236}">
+                <a16:creationId xmlns:a16="http://schemas.microsoft.com/office/drawing/2014/main" id="{3197321E-6F7D-DF41-A6B6-5D56EA22F306}"/>
+              </a:ext>
+            </a:extLst>
+          </p:cNvPr>
+          <p:cNvSpPr/>
+          <p:nvPr/>
+        </p:nvSpPr>
+        <p:spPr>
+          <a:xfrm>
+            <a:off x="2166817" y="5890269"/>
+            <a:ext cx="1325773" cy="756389"/>
+          </a:xfrm>
+          <a:prstGeom prst="roundRect">
+            <a:avLst/>
+          </a:prstGeom>
+          <a:noFill/>
+          <a:ln w="38100">
+            <a:solidFill>
+              <a:schemeClr val="accent6">
+                <a:lumMod val="75000"/>
+              </a:schemeClr>
+            </a:solidFill>
+          </a:ln>
+        </p:spPr>
+        <p:style>
+          <a:lnRef idx="2">
+            <a:schemeClr val="accent1">
+              <a:shade val="50000"/>
+            </a:schemeClr>
+          </a:lnRef>
+          <a:fillRef idx="1">
+            <a:schemeClr val="accent1"/>
+          </a:fillRef>
+          <a:effectRef idx="0">
+            <a:schemeClr val="accent1"/>
+          </a:effectRef>
+          <a:fontRef idx="minor">
+            <a:schemeClr val="lt1"/>
+          </a:fontRef>
+        </p:style>
+        <p:txBody>
+          <a:bodyPr rtlCol="0" anchor="ctr"/>
+          <a:lstStyle/>
+          <a:p>
+            <a:pPr algn="ctr"/>
+            <a:r>
+              <a:rPr lang="en-US" b="1" dirty="0">
+                <a:solidFill>
+                  <a:schemeClr val="accent6">
+                    <a:lumMod val="50000"/>
+                  </a:schemeClr>
+                </a:solidFill>
+              </a:rPr>
+              <a:t>Ridge Regression</a:t>
+            </a:r>
+          </a:p>
+        </p:txBody>
+      </p:sp>
+      <p:cxnSp>
+        <p:nvCxnSpPr>
+          <p:cNvPr id="53" name="Straight Arrow Connector 52">
+            <a:extLst>
+              <a:ext uri="{FF2B5EF4-FFF2-40B4-BE49-F238E27FC236}">
+                <a16:creationId xmlns:a16="http://schemas.microsoft.com/office/drawing/2014/main" id="{CF8002D1-7246-6242-87BC-D0D9E90017CC}"/>
+              </a:ext>
+            </a:extLst>
+          </p:cNvPr>
+          <p:cNvCxnSpPr>
+            <a:cxnSpLocks/>
+            <a:stCxn id="13" idx="2"/>
+            <a:endCxn id="51" idx="0"/>
+          </p:cNvCxnSpPr>
+          <p:nvPr/>
+        </p:nvCxnSpPr>
+        <p:spPr>
+          <a:xfrm>
+            <a:off x="1870376" y="3798332"/>
+            <a:ext cx="959328" cy="2091937"/>
           </a:xfrm>
           <a:prstGeom prst="straightConnector1">
             <a:avLst/>
@@ -5991,10 +6105,10 @@
       </p:cxnSp>
       <p:sp>
         <p:nvSpPr>
-          <p:cNvPr id="13" name="TextBox 12">
-            <a:extLst>
-              <a:ext uri="{FF2B5EF4-FFF2-40B4-BE49-F238E27FC236}">
-                <a16:creationId xmlns:a16="http://schemas.microsoft.com/office/drawing/2014/main" id="{C9F63508-7A66-4245-ADE3-803ADC486FC3}"/>
+          <p:cNvPr id="12" name="TextBox 11">
+            <a:extLst>
+              <a:ext uri="{FF2B5EF4-FFF2-40B4-BE49-F238E27FC236}">
+                <a16:creationId xmlns:a16="http://schemas.microsoft.com/office/drawing/2014/main" id="{698690FD-6A17-BD4C-A789-658F2E1952A7}"/>
               </a:ext>
             </a:extLst>
           </p:cNvPr>
@@ -6003,8 +6117,8 @@
         </p:nvSpPr>
         <p:spPr>
           <a:xfrm>
-            <a:off x="1012869" y="3429000"/>
-            <a:ext cx="1715014" cy="369332"/>
+            <a:off x="3828278" y="3429000"/>
+            <a:ext cx="1947735" cy="369332"/>
           </a:xfrm>
           <a:prstGeom prst="rect">
             <a:avLst/>
@@ -6046,11 +6160,121 @@
             <a:pPr algn="ctr"/>
             <a:r>
               <a:rPr lang="en-US" dirty="0"/>
+              <a:t>Classification</a:t>
+            </a:r>
+          </a:p>
+        </p:txBody>
+      </p:sp>
+      <p:sp>
+        <p:nvSpPr>
+          <p:cNvPr id="13" name="TextBox 12">
+            <a:extLst>
+              <a:ext uri="{FF2B5EF4-FFF2-40B4-BE49-F238E27FC236}">
+                <a16:creationId xmlns:a16="http://schemas.microsoft.com/office/drawing/2014/main" id="{C9F63508-7A66-4245-ADE3-803ADC486FC3}"/>
+              </a:ext>
+            </a:extLst>
+          </p:cNvPr>
+          <p:cNvSpPr txBox="1"/>
+          <p:nvPr/>
+        </p:nvSpPr>
+        <p:spPr>
+          <a:xfrm>
+            <a:off x="1012869" y="3429000"/>
+            <a:ext cx="1715014" cy="369332"/>
+          </a:xfrm>
+          <a:prstGeom prst="rect">
+            <a:avLst/>
+          </a:prstGeom>
+          <a:solidFill>
+            <a:schemeClr val="accent2">
+              <a:lumMod val="40000"/>
+              <a:lumOff val="60000"/>
+            </a:schemeClr>
+          </a:solidFill>
+          <a:ln w="38100">
+            <a:solidFill>
+              <a:schemeClr val="accent2">
+                <a:lumMod val="50000"/>
+              </a:schemeClr>
+            </a:solidFill>
+          </a:ln>
+        </p:spPr>
+        <p:style>
+          <a:lnRef idx="2">
+            <a:schemeClr val="accent1"/>
+          </a:lnRef>
+          <a:fillRef idx="1">
+            <a:schemeClr val="lt1"/>
+          </a:fillRef>
+          <a:effectRef idx="0">
+            <a:schemeClr val="accent1"/>
+          </a:effectRef>
+          <a:fontRef idx="minor">
+            <a:schemeClr val="dk1"/>
+          </a:fontRef>
+        </p:style>
+        <p:txBody>
+          <a:bodyPr wrap="square" rtlCol="0">
+            <a:spAutoFit/>
+          </a:bodyPr>
+          <a:lstStyle/>
+          <a:p>
+            <a:pPr algn="ctr"/>
+            <a:r>
+              <a:rPr lang="en-US" dirty="0"/>
               <a:t>Regression</a:t>
             </a:r>
           </a:p>
         </p:txBody>
       </p:sp>
+      <p:cxnSp>
+        <p:nvCxnSpPr>
+          <p:cNvPr id="15" name="Elbow Connector 14">
+            <a:extLst>
+              <a:ext uri="{FF2B5EF4-FFF2-40B4-BE49-F238E27FC236}">
+                <a16:creationId xmlns:a16="http://schemas.microsoft.com/office/drawing/2014/main" id="{E0174620-FA5A-C74C-8B78-6F48E2862BE6}"/>
+              </a:ext>
+            </a:extLst>
+          </p:cNvPr>
+          <p:cNvCxnSpPr>
+            <a:cxnSpLocks/>
+            <a:stCxn id="7" idx="2"/>
+            <a:endCxn id="12" idx="0"/>
+          </p:cNvCxnSpPr>
+          <p:nvPr/>
+        </p:nvCxnSpPr>
+        <p:spPr>
+          <a:xfrm rot="16200000" flipH="1">
+            <a:off x="3722474" y="2349327"/>
+            <a:ext cx="699701" cy="1459644"/>
+          </a:xfrm>
+          <a:prstGeom prst="bentConnector3">
+            <a:avLst>
+              <a:gd name="adj1" fmla="val 50000"/>
+            </a:avLst>
+          </a:prstGeom>
+          <a:ln w="38100">
+            <a:solidFill>
+              <a:schemeClr val="tx1"/>
+            </a:solidFill>
+            <a:tailEnd type="triangle"/>
+          </a:ln>
+        </p:spPr>
+        <p:style>
+          <a:lnRef idx="1">
+            <a:schemeClr val="accent1"/>
+          </a:lnRef>
+          <a:fillRef idx="0">
+            <a:schemeClr val="accent1"/>
+          </a:fillRef>
+          <a:effectRef idx="0">
+            <a:schemeClr val="accent1"/>
+          </a:effectRef>
+          <a:fontRef idx="minor">
+            <a:schemeClr val="tx1"/>
+          </a:fontRef>
+        </p:style>
+      </p:cxnSp>
       <p:cxnSp>
         <p:nvCxnSpPr>
           <p:cNvPr id="25" name="Straight Connector 24">
@@ -6302,10 +6526,47 @@
       </p:sp>
       <p:sp>
         <p:nvSpPr>
-          <p:cNvPr id="59" name="Rounded Rectangle 58">
-            <a:extLst>
-              <a:ext uri="{FF2B5EF4-FFF2-40B4-BE49-F238E27FC236}">
-                <a16:creationId xmlns:a16="http://schemas.microsoft.com/office/drawing/2014/main" id="{82AAB0E2-BB8A-7F4D-8CA0-0D1196336BA6}"/>
+          <p:cNvPr id="48" name="TextBox 47">
+            <a:extLst>
+              <a:ext uri="{FF2B5EF4-FFF2-40B4-BE49-F238E27FC236}">
+                <a16:creationId xmlns:a16="http://schemas.microsoft.com/office/drawing/2014/main" id="{4CB6C1FA-EE03-034B-A7CF-5DCAD3774325}"/>
+              </a:ext>
+            </a:extLst>
+          </p:cNvPr>
+          <p:cNvSpPr txBox="1"/>
+          <p:nvPr/>
+        </p:nvSpPr>
+        <p:spPr>
+          <a:xfrm>
+            <a:off x="3298101" y="2765510"/>
+            <a:ext cx="1472126" cy="338554"/>
+          </a:xfrm>
+          <a:prstGeom prst="rect">
+            <a:avLst/>
+          </a:prstGeom>
+          <a:noFill/>
+        </p:spPr>
+        <p:txBody>
+          <a:bodyPr wrap="square" rtlCol="0">
+            <a:spAutoFit/>
+          </a:bodyPr>
+          <a:lstStyle/>
+          <a:p>
+            <a:pPr algn="ctr"/>
+            <a:r>
+              <a:rPr lang="en-US" sz="1600" dirty="0"/>
+              <a:t>Category</a:t>
+            </a:r>
+            <a:endParaRPr lang="en-US" dirty="0"/>
+          </a:p>
+        </p:txBody>
+      </p:sp>
+      <p:sp>
+        <p:nvSpPr>
+          <p:cNvPr id="56" name="Rounded Rectangle 55">
+            <a:extLst>
+              <a:ext uri="{FF2B5EF4-FFF2-40B4-BE49-F238E27FC236}">
+                <a16:creationId xmlns:a16="http://schemas.microsoft.com/office/drawing/2014/main" id="{5BA41299-C966-D543-B050-371D1BA5090B}"/>
               </a:ext>
             </a:extLst>
           </p:cNvPr>
@@ -6314,8 +6575,8 @@
         </p:nvSpPr>
         <p:spPr>
           <a:xfrm>
-            <a:off x="164631" y="4849796"/>
-            <a:ext cx="1325773" cy="559612"/>
+            <a:off x="3078510" y="5255376"/>
+            <a:ext cx="993814" cy="425192"/>
           </a:xfrm>
           <a:prstGeom prst="roundRect">
             <a:avLst/>
@@ -6358,7 +6619,196 @@
                   </a:schemeClr>
                 </a:solidFill>
               </a:rPr>
+              <a:t>KNN</a:t>
+            </a:r>
+          </a:p>
+        </p:txBody>
+      </p:sp>
+      <p:sp>
+        <p:nvSpPr>
+          <p:cNvPr id="57" name="Rounded Rectangle 56">
+            <a:extLst>
+              <a:ext uri="{FF2B5EF4-FFF2-40B4-BE49-F238E27FC236}">
+                <a16:creationId xmlns:a16="http://schemas.microsoft.com/office/drawing/2014/main" id="{358681B3-4EB7-BF44-9FBD-0C182091A694}"/>
+              </a:ext>
+            </a:extLst>
+          </p:cNvPr>
+          <p:cNvSpPr/>
+          <p:nvPr/>
+        </p:nvSpPr>
+        <p:spPr>
+          <a:xfrm>
+            <a:off x="4238628" y="5264193"/>
+            <a:ext cx="1325773" cy="559612"/>
+          </a:xfrm>
+          <a:prstGeom prst="roundRect">
+            <a:avLst/>
+          </a:prstGeom>
+          <a:noFill/>
+          <a:ln w="38100">
+            <a:solidFill>
+              <a:schemeClr val="accent6">
+                <a:lumMod val="75000"/>
+              </a:schemeClr>
+            </a:solidFill>
+          </a:ln>
+        </p:spPr>
+        <p:style>
+          <a:lnRef idx="2">
+            <a:schemeClr val="accent1">
+              <a:shade val="50000"/>
+            </a:schemeClr>
+          </a:lnRef>
+          <a:fillRef idx="1">
+            <a:schemeClr val="accent1"/>
+          </a:fillRef>
+          <a:effectRef idx="0">
+            <a:schemeClr val="accent1"/>
+          </a:effectRef>
+          <a:fontRef idx="minor">
+            <a:schemeClr val="lt1"/>
+          </a:fontRef>
+        </p:style>
+        <p:txBody>
+          <a:bodyPr rtlCol="0" anchor="ctr"/>
+          <a:lstStyle/>
+          <a:p>
+            <a:pPr algn="ctr"/>
+            <a:r>
+              <a:rPr lang="en-US" b="1" dirty="0">
+                <a:solidFill>
+                  <a:schemeClr val="accent6">
+                    <a:lumMod val="50000"/>
+                  </a:schemeClr>
+                </a:solidFill>
+              </a:rPr>
+              <a:t>Logistic Regression</a:t>
+            </a:r>
+          </a:p>
+        </p:txBody>
+      </p:sp>
+      <p:sp>
+        <p:nvSpPr>
+          <p:cNvPr id="59" name="Rounded Rectangle 58">
+            <a:extLst>
+              <a:ext uri="{FF2B5EF4-FFF2-40B4-BE49-F238E27FC236}">
+                <a16:creationId xmlns:a16="http://schemas.microsoft.com/office/drawing/2014/main" id="{82AAB0E2-BB8A-7F4D-8CA0-0D1196336BA6}"/>
+              </a:ext>
+            </a:extLst>
+          </p:cNvPr>
+          <p:cNvSpPr/>
+          <p:nvPr/>
+        </p:nvSpPr>
+        <p:spPr>
+          <a:xfrm>
+            <a:off x="164631" y="4849796"/>
+            <a:ext cx="1325773" cy="559612"/>
+          </a:xfrm>
+          <a:prstGeom prst="roundRect">
+            <a:avLst/>
+          </a:prstGeom>
+          <a:noFill/>
+          <a:ln w="38100">
+            <a:solidFill>
+              <a:schemeClr val="accent6">
+                <a:lumMod val="75000"/>
+              </a:schemeClr>
+            </a:solidFill>
+          </a:ln>
+        </p:spPr>
+        <p:style>
+          <a:lnRef idx="2">
+            <a:schemeClr val="accent1">
+              <a:shade val="50000"/>
+            </a:schemeClr>
+          </a:lnRef>
+          <a:fillRef idx="1">
+            <a:schemeClr val="accent1"/>
+          </a:fillRef>
+          <a:effectRef idx="0">
+            <a:schemeClr val="accent1"/>
+          </a:effectRef>
+          <a:fontRef idx="minor">
+            <a:schemeClr val="lt1"/>
+          </a:fontRef>
+        </p:style>
+        <p:txBody>
+          <a:bodyPr rtlCol="0" anchor="ctr"/>
+          <a:lstStyle/>
+          <a:p>
+            <a:pPr algn="ctr"/>
+            <a:r>
+              <a:rPr lang="en-US" b="1" dirty="0">
+                <a:solidFill>
+                  <a:schemeClr val="accent6">
+                    <a:lumMod val="50000"/>
+                  </a:schemeClr>
+                </a:solidFill>
+              </a:rPr>
               <a:t>Linear Regression</a:t>
+            </a:r>
+          </a:p>
+        </p:txBody>
+      </p:sp>
+      <p:sp>
+        <p:nvSpPr>
+          <p:cNvPr id="60" name="Rounded Rectangle 59">
+            <a:extLst>
+              <a:ext uri="{FF2B5EF4-FFF2-40B4-BE49-F238E27FC236}">
+                <a16:creationId xmlns:a16="http://schemas.microsoft.com/office/drawing/2014/main" id="{5F3E4682-9849-A84A-8DF2-ED143F603F1C}"/>
+              </a:ext>
+            </a:extLst>
+          </p:cNvPr>
+          <p:cNvSpPr/>
+          <p:nvPr/>
+        </p:nvSpPr>
+        <p:spPr>
+          <a:xfrm>
+            <a:off x="1026516" y="5823805"/>
+            <a:ext cx="993813" cy="406924"/>
+          </a:xfrm>
+          <a:prstGeom prst="roundRect">
+            <a:avLst/>
+          </a:prstGeom>
+          <a:noFill/>
+          <a:ln w="38100">
+            <a:solidFill>
+              <a:schemeClr val="accent6">
+                <a:lumMod val="75000"/>
+              </a:schemeClr>
+            </a:solidFill>
+          </a:ln>
+        </p:spPr>
+        <p:style>
+          <a:lnRef idx="2">
+            <a:schemeClr val="accent1">
+              <a:shade val="50000"/>
+            </a:schemeClr>
+          </a:lnRef>
+          <a:fillRef idx="1">
+            <a:schemeClr val="accent1"/>
+          </a:fillRef>
+          <a:effectRef idx="0">
+            <a:schemeClr val="accent1"/>
+          </a:effectRef>
+          <a:fontRef idx="minor">
+            <a:schemeClr val="lt1"/>
+          </a:fontRef>
+        </p:style>
+        <p:txBody>
+          <a:bodyPr rtlCol="0" anchor="ctr"/>
+          <a:lstStyle/>
+          <a:p>
+            <a:pPr algn="ctr"/>
+            <a:r>
+              <a:rPr lang="en-US" b="1" dirty="0">
+                <a:solidFill>
+                  <a:schemeClr val="accent6">
+                    <a:lumMod val="50000"/>
+                  </a:schemeClr>
+                </a:solidFill>
+              </a:rPr>
+              <a:t>LASSO</a:t>
             </a:r>
           </a:p>
         </p:txBody>
@@ -6382,6 +6832,250 @@
           <a:xfrm flipH="1">
             <a:off x="827518" y="3798332"/>
             <a:ext cx="1042858" cy="1051464"/>
+          </a:xfrm>
+          <a:prstGeom prst="straightConnector1">
+            <a:avLst/>
+          </a:prstGeom>
+          <a:ln w="38100">
+            <a:solidFill>
+              <a:schemeClr val="tx1"/>
+            </a:solidFill>
+            <a:tailEnd type="triangle"/>
+          </a:ln>
+        </p:spPr>
+        <p:style>
+          <a:lnRef idx="1">
+            <a:schemeClr val="accent1"/>
+          </a:lnRef>
+          <a:fillRef idx="0">
+            <a:schemeClr val="accent1"/>
+          </a:fillRef>
+          <a:effectRef idx="0">
+            <a:schemeClr val="accent1"/>
+          </a:effectRef>
+          <a:fontRef idx="minor">
+            <a:schemeClr val="tx1"/>
+          </a:fontRef>
+        </p:style>
+      </p:cxnSp>
+      <p:cxnSp>
+        <p:nvCxnSpPr>
+          <p:cNvPr id="71" name="Straight Arrow Connector 70">
+            <a:extLst>
+              <a:ext uri="{FF2B5EF4-FFF2-40B4-BE49-F238E27FC236}">
+                <a16:creationId xmlns:a16="http://schemas.microsoft.com/office/drawing/2014/main" id="{6BD223BB-2486-4247-B406-0880EC47A3D9}"/>
+              </a:ext>
+            </a:extLst>
+          </p:cNvPr>
+          <p:cNvCxnSpPr>
+            <a:stCxn id="13" idx="2"/>
+            <a:endCxn id="60" idx="0"/>
+          </p:cNvCxnSpPr>
+          <p:nvPr/>
+        </p:nvCxnSpPr>
+        <p:spPr>
+          <a:xfrm flipH="1">
+            <a:off x="1523423" y="3798332"/>
+            <a:ext cx="346953" cy="2025473"/>
+          </a:xfrm>
+          <a:prstGeom prst="straightConnector1">
+            <a:avLst/>
+          </a:prstGeom>
+          <a:ln w="38100">
+            <a:solidFill>
+              <a:schemeClr val="tx1"/>
+            </a:solidFill>
+            <a:tailEnd type="triangle"/>
+          </a:ln>
+        </p:spPr>
+        <p:style>
+          <a:lnRef idx="1">
+            <a:schemeClr val="accent1"/>
+          </a:lnRef>
+          <a:fillRef idx="0">
+            <a:schemeClr val="accent1"/>
+          </a:fillRef>
+          <a:effectRef idx="0">
+            <a:schemeClr val="accent1"/>
+          </a:effectRef>
+          <a:fontRef idx="minor">
+            <a:schemeClr val="tx1"/>
+          </a:fontRef>
+        </p:style>
+      </p:cxnSp>
+      <p:cxnSp>
+        <p:nvCxnSpPr>
+          <p:cNvPr id="77" name="Straight Arrow Connector 76">
+            <a:extLst>
+              <a:ext uri="{FF2B5EF4-FFF2-40B4-BE49-F238E27FC236}">
+                <a16:creationId xmlns:a16="http://schemas.microsoft.com/office/drawing/2014/main" id="{E85198A7-8060-EB44-9561-DF83F369E4B5}"/>
+              </a:ext>
+            </a:extLst>
+          </p:cNvPr>
+          <p:cNvCxnSpPr>
+            <a:stCxn id="12" idx="2"/>
+            <a:endCxn id="56" idx="0"/>
+          </p:cNvCxnSpPr>
+          <p:nvPr/>
+        </p:nvCxnSpPr>
+        <p:spPr>
+          <a:xfrm flipH="1">
+            <a:off x="3575417" y="3798332"/>
+            <a:ext cx="1226729" cy="1457044"/>
+          </a:xfrm>
+          <a:prstGeom prst="straightConnector1">
+            <a:avLst/>
+          </a:prstGeom>
+          <a:ln w="38100">
+            <a:solidFill>
+              <a:schemeClr val="tx1"/>
+            </a:solidFill>
+            <a:tailEnd type="triangle"/>
+          </a:ln>
+        </p:spPr>
+        <p:style>
+          <a:lnRef idx="1">
+            <a:schemeClr val="accent1"/>
+          </a:lnRef>
+          <a:fillRef idx="0">
+            <a:schemeClr val="accent1"/>
+          </a:fillRef>
+          <a:effectRef idx="0">
+            <a:schemeClr val="accent1"/>
+          </a:effectRef>
+          <a:fontRef idx="minor">
+            <a:schemeClr val="tx1"/>
+          </a:fontRef>
+        </p:style>
+      </p:cxnSp>
+      <p:cxnSp>
+        <p:nvCxnSpPr>
+          <p:cNvPr id="81" name="Straight Arrow Connector 80">
+            <a:extLst>
+              <a:ext uri="{FF2B5EF4-FFF2-40B4-BE49-F238E27FC236}">
+                <a16:creationId xmlns:a16="http://schemas.microsoft.com/office/drawing/2014/main" id="{A51BCBEA-89F2-0E43-A436-5E42388A91D9}"/>
+              </a:ext>
+            </a:extLst>
+          </p:cNvPr>
+          <p:cNvCxnSpPr>
+            <a:stCxn id="12" idx="2"/>
+            <a:endCxn id="57" idx="0"/>
+          </p:cNvCxnSpPr>
+          <p:nvPr/>
+        </p:nvCxnSpPr>
+        <p:spPr>
+          <a:xfrm>
+            <a:off x="4802146" y="3798332"/>
+            <a:ext cx="99369" cy="1465861"/>
+          </a:xfrm>
+          <a:prstGeom prst="straightConnector1">
+            <a:avLst/>
+          </a:prstGeom>
+          <a:ln w="38100">
+            <a:solidFill>
+              <a:schemeClr val="tx1"/>
+            </a:solidFill>
+            <a:tailEnd type="triangle"/>
+          </a:ln>
+        </p:spPr>
+        <p:style>
+          <a:lnRef idx="1">
+            <a:schemeClr val="accent1"/>
+          </a:lnRef>
+          <a:fillRef idx="0">
+            <a:schemeClr val="accent1"/>
+          </a:fillRef>
+          <a:effectRef idx="0">
+            <a:schemeClr val="accent1"/>
+          </a:effectRef>
+          <a:fontRef idx="minor">
+            <a:schemeClr val="tx1"/>
+          </a:fontRef>
+        </p:style>
+      </p:cxnSp>
+      <p:sp>
+        <p:nvSpPr>
+          <p:cNvPr id="51" name="Rounded Rectangle 50">
+            <a:extLst>
+              <a:ext uri="{FF2B5EF4-FFF2-40B4-BE49-F238E27FC236}">
+                <a16:creationId xmlns:a16="http://schemas.microsoft.com/office/drawing/2014/main" id="{3197321E-6F7D-DF41-A6B6-5D56EA22F306}"/>
+              </a:ext>
+            </a:extLst>
+          </p:cNvPr>
+          <p:cNvSpPr/>
+          <p:nvPr/>
+        </p:nvSpPr>
+        <p:spPr>
+          <a:xfrm>
+            <a:off x="2166817" y="5890269"/>
+            <a:ext cx="1325773" cy="756389"/>
+          </a:xfrm>
+          <a:prstGeom prst="roundRect">
+            <a:avLst/>
+          </a:prstGeom>
+          <a:noFill/>
+          <a:ln w="38100">
+            <a:solidFill>
+              <a:schemeClr val="accent6">
+                <a:lumMod val="75000"/>
+              </a:schemeClr>
+            </a:solidFill>
+          </a:ln>
+        </p:spPr>
+        <p:style>
+          <a:lnRef idx="2">
+            <a:schemeClr val="accent1">
+              <a:shade val="50000"/>
+            </a:schemeClr>
+          </a:lnRef>
+          <a:fillRef idx="1">
+            <a:schemeClr val="accent1"/>
+          </a:fillRef>
+          <a:effectRef idx="0">
+            <a:schemeClr val="accent1"/>
+          </a:effectRef>
+          <a:fontRef idx="minor">
+            <a:schemeClr val="lt1"/>
+          </a:fontRef>
+        </p:style>
+        <p:txBody>
+          <a:bodyPr rtlCol="0" anchor="ctr"/>
+          <a:lstStyle/>
+          <a:p>
+            <a:pPr algn="ctr"/>
+            <a:r>
+              <a:rPr lang="en-US" b="1" dirty="0">
+                <a:solidFill>
+                  <a:schemeClr val="accent6">
+                    <a:lumMod val="50000"/>
+                  </a:schemeClr>
+                </a:solidFill>
+              </a:rPr>
+              <a:t>Ridge Regression</a:t>
+            </a:r>
+          </a:p>
+        </p:txBody>
+      </p:sp>
+      <p:cxnSp>
+        <p:nvCxnSpPr>
+          <p:cNvPr id="53" name="Straight Arrow Connector 52">
+            <a:extLst>
+              <a:ext uri="{FF2B5EF4-FFF2-40B4-BE49-F238E27FC236}">
+                <a16:creationId xmlns:a16="http://schemas.microsoft.com/office/drawing/2014/main" id="{CF8002D1-7246-6242-87BC-D0D9E90017CC}"/>
+              </a:ext>
+            </a:extLst>
+          </p:cNvPr>
+          <p:cNvCxnSpPr>
+            <a:cxnSpLocks/>
+            <a:stCxn id="13" idx="2"/>
+            <a:endCxn id="51" idx="0"/>
+          </p:cNvCxnSpPr>
+          <p:nvPr/>
+        </p:nvCxnSpPr>
+        <p:spPr>
+          <a:xfrm>
+            <a:off x="1870376" y="3798332"/>
+            <a:ext cx="959328" cy="2091937"/>
           </a:xfrm>
           <a:prstGeom prst="straightConnector1">
             <a:avLst/>
@@ -6411,7 +7105,7 @@
     </p:spTree>
     <p:extLst>
       <p:ext uri="{BB962C8B-B14F-4D97-AF65-F5344CB8AC3E}">
-        <p14:creationId xmlns:p14="http://schemas.microsoft.com/office/powerpoint/2010/main" val="3885847686"/>
+        <p14:creationId xmlns:p14="http://schemas.microsoft.com/office/powerpoint/2010/main" val="268294857"/>
       </p:ext>
     </p:extLst>
   </p:cSld>

</xml_diff>